<commit_message>
Fix font related spacing in binary data examples on slides
</commit_message>
<xml_diff>
--- a/slides/P-DFDL-CSVToBin-Training-Slides.pptx
+++ b/slides/P-DFDL-CSVToBin-Training-Slides.pptx
@@ -6,20 +6,12 @@
 </p188:authorLst>
 </file>
 
-<file path=ppt/revisionInfo.xml><?xml version="1.0" encoding="utf-8"?>
-<p1510:revInfo xmlns:a="http://schemas.openxmlformats.org/drawingml/2006/main" xmlns:r="http://schemas.openxmlformats.org/officeDocument/2006/relationships" xmlns:p1510="http://schemas.microsoft.com/office/powerpoint/2015/10/main">
-  <p1510:revLst>
-    <p1510:client id="{323D2D99-C403-459F-9C97-C4707BE658D2}" v="2" dt="2025-11-19T22:47:32.841"/>
-  </p1510:revLst>
-</p1510:revInfo>
-</file>
-
 <file path=ppt/changesInfos/changesInfo1.xml><?xml version="1.0" encoding="utf-8"?>
 <pc:chgInfo xmlns:a="http://schemas.openxmlformats.org/drawingml/2006/main" xmlns:r="http://schemas.openxmlformats.org/officeDocument/2006/relationships" xmlns:ac="http://schemas.microsoft.com/office/drawing/2013/main/command" xmlns:pc="http://schemas.microsoft.com/office/powerpoint/2013/main/command">
   <pc:docChgLst>
     <pc:chgData name="Beckerle, Mike" userId="41155a9a-513c-4288-9ceb-5c90f574ab21" providerId="ADAL" clId="{93EA92E5-423E-4026-A29C-DC3240D7B59D}"/>
     <pc:docChg chg="custSel addSld delSld modSld delSection modSection">
-      <pc:chgData name="Beckerle, Mike" userId="41155a9a-513c-4288-9ceb-5c90f574ab21" providerId="ADAL" clId="{93EA92E5-423E-4026-A29C-DC3240D7B59D}" dt="2025-11-19T22:54:37.912" v="141" actId="20577"/>
+      <pc:chgData name="Beckerle, Mike" userId="41155a9a-513c-4288-9ceb-5c90f574ab21" providerId="ADAL" clId="{93EA92E5-423E-4026-A29C-DC3240D7B59D}" dt="2025-11-24T21:53:26.328" v="313" actId="20577"/>
       <pc:docMkLst>
         <pc:docMk/>
       </pc:docMkLst>
@@ -67,36 +59,6 @@
           <pc:sldMk cId="0" sldId="259"/>
         </pc:sldMkLst>
       </pc:sldChg>
-      <pc:sldChg chg="modSp add del mod">
-        <pc:chgData name="Beckerle, Mike" userId="41155a9a-513c-4288-9ceb-5c90f574ab21" providerId="ADAL" clId="{93EA92E5-423E-4026-A29C-DC3240D7B59D}" dt="2025-11-19T22:36:39.451" v="78" actId="47"/>
-        <pc:sldMkLst>
-          <pc:docMk/>
-          <pc:sldMk cId="0" sldId="260"/>
-        </pc:sldMkLst>
-        <pc:spChg chg="mod">
-          <ac:chgData name="Beckerle, Mike" userId="41155a9a-513c-4288-9ceb-5c90f574ab21" providerId="ADAL" clId="{93EA92E5-423E-4026-A29C-DC3240D7B59D}" dt="2025-11-19T22:35:05.661" v="7" actId="27636"/>
-          <ac:spMkLst>
-            <pc:docMk/>
-            <pc:sldMk cId="0" sldId="260"/>
-            <ac:spMk id="2" creationId="{E1ED0768-395B-42F3-AD31-C6CA7D1A308C}"/>
-          </ac:spMkLst>
-        </pc:spChg>
-      </pc:sldChg>
-      <pc:sldChg chg="modSp add del mod">
-        <pc:chgData name="Beckerle, Mike" userId="41155a9a-513c-4288-9ceb-5c90f574ab21" providerId="ADAL" clId="{93EA92E5-423E-4026-A29C-DC3240D7B59D}" dt="2025-11-19T22:36:39.451" v="78" actId="47"/>
-        <pc:sldMkLst>
-          <pc:docMk/>
-          <pc:sldMk cId="0" sldId="261"/>
-        </pc:sldMkLst>
-        <pc:spChg chg="mod">
-          <ac:chgData name="Beckerle, Mike" userId="41155a9a-513c-4288-9ceb-5c90f574ab21" providerId="ADAL" clId="{93EA92E5-423E-4026-A29C-DC3240D7B59D}" dt="2025-11-19T22:35:05.674" v="8" actId="27636"/>
-          <ac:spMkLst>
-            <pc:docMk/>
-            <pc:sldMk cId="0" sldId="261"/>
-            <ac:spMk id="16386" creationId="{288A3D22-3BAE-4456-B540-93705F09682A}"/>
-          </ac:spMkLst>
-        </pc:spChg>
-      </pc:sldChg>
       <pc:sldChg chg="modSp add mod">
         <pc:chgData name="Beckerle, Mike" userId="41155a9a-513c-4288-9ceb-5c90f574ab21" providerId="ADAL" clId="{93EA92E5-423E-4026-A29C-DC3240D7B59D}" dt="2025-11-19T22:35:06.058" v="40" actId="27636"/>
         <pc:sldMkLst>
@@ -112,13 +74,6 @@
           </ac:spMkLst>
         </pc:spChg>
       </pc:sldChg>
-      <pc:sldChg chg="add del">
-        <pc:chgData name="Beckerle, Mike" userId="41155a9a-513c-4288-9ceb-5c90f574ab21" providerId="ADAL" clId="{93EA92E5-423E-4026-A29C-DC3240D7B59D}" dt="2025-11-19T22:37:01.601" v="79" actId="47"/>
-        <pc:sldMkLst>
-          <pc:docMk/>
-          <pc:sldMk cId="0" sldId="263"/>
-        </pc:sldMkLst>
-      </pc:sldChg>
       <pc:sldChg chg="modSp add mod">
         <pc:chgData name="Beckerle, Mike" userId="41155a9a-513c-4288-9ceb-5c90f574ab21" providerId="ADAL" clId="{93EA92E5-423E-4026-A29C-DC3240D7B59D}" dt="2025-11-19T22:35:06.378" v="70" actId="27636"/>
         <pc:sldMkLst>
@@ -185,108 +140,6 @@
           </ac:spMkLst>
         </pc:spChg>
       </pc:sldChg>
-      <pc:sldChg chg="add del">
-        <pc:chgData name="Beckerle, Mike" userId="41155a9a-513c-4288-9ceb-5c90f574ab21" providerId="ADAL" clId="{93EA92E5-423E-4026-A29C-DC3240D7B59D}" dt="2025-11-19T22:37:01.601" v="79" actId="47"/>
-        <pc:sldMkLst>
-          <pc:docMk/>
-          <pc:sldMk cId="141756896" sldId="329"/>
-        </pc:sldMkLst>
-      </pc:sldChg>
-      <pc:sldChg chg="add del">
-        <pc:chgData name="Beckerle, Mike" userId="41155a9a-513c-4288-9ceb-5c90f574ab21" providerId="ADAL" clId="{93EA92E5-423E-4026-A29C-DC3240D7B59D}" dt="2025-11-19T22:37:01.601" v="79" actId="47"/>
-        <pc:sldMkLst>
-          <pc:docMk/>
-          <pc:sldMk cId="718717029" sldId="330"/>
-        </pc:sldMkLst>
-      </pc:sldChg>
-      <pc:sldChg chg="add del">
-        <pc:chgData name="Beckerle, Mike" userId="41155a9a-513c-4288-9ceb-5c90f574ab21" providerId="ADAL" clId="{93EA92E5-423E-4026-A29C-DC3240D7B59D}" dt="2025-11-19T22:37:01.601" v="79" actId="47"/>
-        <pc:sldMkLst>
-          <pc:docMk/>
-          <pc:sldMk cId="1073451390" sldId="331"/>
-        </pc:sldMkLst>
-      </pc:sldChg>
-      <pc:sldChg chg="add del">
-        <pc:chgData name="Beckerle, Mike" userId="41155a9a-513c-4288-9ceb-5c90f574ab21" providerId="ADAL" clId="{93EA92E5-423E-4026-A29C-DC3240D7B59D}" dt="2025-11-19T22:37:01.601" v="79" actId="47"/>
-        <pc:sldMkLst>
-          <pc:docMk/>
-          <pc:sldMk cId="78212637" sldId="332"/>
-        </pc:sldMkLst>
-      </pc:sldChg>
-      <pc:sldChg chg="add del">
-        <pc:chgData name="Beckerle, Mike" userId="41155a9a-513c-4288-9ceb-5c90f574ab21" providerId="ADAL" clId="{93EA92E5-423E-4026-A29C-DC3240D7B59D}" dt="2025-11-19T22:37:01.601" v="79" actId="47"/>
-        <pc:sldMkLst>
-          <pc:docMk/>
-          <pc:sldMk cId="3695641978" sldId="333"/>
-        </pc:sldMkLst>
-      </pc:sldChg>
-      <pc:sldChg chg="modSp add del mod">
-        <pc:chgData name="Beckerle, Mike" userId="41155a9a-513c-4288-9ceb-5c90f574ab21" providerId="ADAL" clId="{93EA92E5-423E-4026-A29C-DC3240D7B59D}" dt="2025-11-19T22:50:26.627" v="136" actId="2696"/>
-        <pc:sldMkLst>
-          <pc:docMk/>
-          <pc:sldMk cId="1493039613" sldId="347"/>
-        </pc:sldMkLst>
-        <pc:spChg chg="mod">
-          <ac:chgData name="Beckerle, Mike" userId="41155a9a-513c-4288-9ceb-5c90f574ab21" providerId="ADAL" clId="{93EA92E5-423E-4026-A29C-DC3240D7B59D}" dt="2025-11-19T22:35:06.328" v="62" actId="27636"/>
-          <ac:spMkLst>
-            <pc:docMk/>
-            <pc:sldMk cId="1493039613" sldId="347"/>
-            <ac:spMk id="3" creationId="{ABC8D2A6-CF07-4F40-B64D-D65D4C85366B}"/>
-          </ac:spMkLst>
-        </pc:spChg>
-      </pc:sldChg>
-      <pc:sldChg chg="add del">
-        <pc:chgData name="Beckerle, Mike" userId="41155a9a-513c-4288-9ceb-5c90f574ab21" providerId="ADAL" clId="{93EA92E5-423E-4026-A29C-DC3240D7B59D}" dt="2025-11-19T22:37:01.601" v="79" actId="47"/>
-        <pc:sldMkLst>
-          <pc:docMk/>
-          <pc:sldMk cId="1375960953" sldId="352"/>
-        </pc:sldMkLst>
-      </pc:sldChg>
-      <pc:sldChg chg="modSp add del mod">
-        <pc:chgData name="Beckerle, Mike" userId="41155a9a-513c-4288-9ceb-5c90f574ab21" providerId="ADAL" clId="{93EA92E5-423E-4026-A29C-DC3240D7B59D}" dt="2025-11-19T22:53:21.051" v="137" actId="2696"/>
-        <pc:sldMkLst>
-          <pc:docMk/>
-          <pc:sldMk cId="1105644699" sldId="359"/>
-        </pc:sldMkLst>
-        <pc:spChg chg="mod">
-          <ac:chgData name="Beckerle, Mike" userId="41155a9a-513c-4288-9ceb-5c90f574ab21" providerId="ADAL" clId="{93EA92E5-423E-4026-A29C-DC3240D7B59D}" dt="2025-11-19T22:35:06.348" v="65" actId="27636"/>
-          <ac:spMkLst>
-            <pc:docMk/>
-            <pc:sldMk cId="1105644699" sldId="359"/>
-            <ac:spMk id="15382" creationId="{00000000-0000-0000-0000-000000000000}"/>
-          </ac:spMkLst>
-        </pc:spChg>
-      </pc:sldChg>
-      <pc:sldChg chg="modSp add del mod">
-        <pc:chgData name="Beckerle, Mike" userId="41155a9a-513c-4288-9ceb-5c90f574ab21" providerId="ADAL" clId="{93EA92E5-423E-4026-A29C-DC3240D7B59D}" dt="2025-11-19T22:50:26.627" v="136" actId="2696"/>
-        <pc:sldMkLst>
-          <pc:docMk/>
-          <pc:sldMk cId="2093094244" sldId="360"/>
-        </pc:sldMkLst>
-        <pc:spChg chg="mod">
-          <ac:chgData name="Beckerle, Mike" userId="41155a9a-513c-4288-9ceb-5c90f574ab21" providerId="ADAL" clId="{93EA92E5-423E-4026-A29C-DC3240D7B59D}" dt="2025-11-19T22:35:06.333" v="63" actId="27636"/>
-          <ac:spMkLst>
-            <pc:docMk/>
-            <pc:sldMk cId="2093094244" sldId="360"/>
-            <ac:spMk id="6" creationId="{35D15E26-4495-4AD2-9343-E26D2CC3AA16}"/>
-          </ac:spMkLst>
-        </pc:spChg>
-      </pc:sldChg>
-      <pc:sldChg chg="modSp add del mod">
-        <pc:chgData name="Beckerle, Mike" userId="41155a9a-513c-4288-9ceb-5c90f574ab21" providerId="ADAL" clId="{93EA92E5-423E-4026-A29C-DC3240D7B59D}" dt="2025-11-19T22:36:39.451" v="78" actId="47"/>
-        <pc:sldMkLst>
-          <pc:docMk/>
-          <pc:sldMk cId="3497120881" sldId="388"/>
-        </pc:sldMkLst>
-        <pc:spChg chg="mod">
-          <ac:chgData name="Beckerle, Mike" userId="41155a9a-513c-4288-9ceb-5c90f574ab21" providerId="ADAL" clId="{93EA92E5-423E-4026-A29C-DC3240D7B59D}" dt="2025-11-19T22:35:05.680" v="9" actId="27636"/>
-          <ac:spMkLst>
-            <pc:docMk/>
-            <pc:sldMk cId="3497120881" sldId="388"/>
-            <ac:spMk id="9" creationId="{BC43AEC3-E848-4FEB-B750-13C386D30E4B}"/>
-          </ac:spMkLst>
-        </pc:spChg>
-      </pc:sldChg>
       <pc:sldChg chg="modSp add mod">
         <pc:chgData name="Beckerle, Mike" userId="41155a9a-513c-4288-9ceb-5c90f574ab21" providerId="ADAL" clId="{93EA92E5-423E-4026-A29C-DC3240D7B59D}" dt="2025-11-19T22:35:06.413" v="74" actId="27636"/>
         <pc:sldMkLst>
@@ -421,21 +274,6 @@
           </ac:spMkLst>
         </pc:spChg>
       </pc:sldChg>
-      <pc:sldChg chg="modSp add del mod">
-        <pc:chgData name="Beckerle, Mike" userId="41155a9a-513c-4288-9ceb-5c90f574ab21" providerId="ADAL" clId="{93EA92E5-423E-4026-A29C-DC3240D7B59D}" dt="2025-11-19T22:40:22.253" v="82" actId="47"/>
-        <pc:sldMkLst>
-          <pc:docMk/>
-          <pc:sldMk cId="1516874412" sldId="405"/>
-        </pc:sldMkLst>
-        <pc:spChg chg="mod">
-          <ac:chgData name="Beckerle, Mike" userId="41155a9a-513c-4288-9ceb-5c90f574ab21" providerId="ADAL" clId="{93EA92E5-423E-4026-A29C-DC3240D7B59D}" dt="2025-11-19T22:35:06.125" v="49" actId="27636"/>
-          <ac:spMkLst>
-            <pc:docMk/>
-            <pc:sldMk cId="1516874412" sldId="405"/>
-            <ac:spMk id="6" creationId="{6DB6A024-54D9-4063-BC58-0C99CD2EFC1D}"/>
-          </ac:spMkLst>
-        </pc:spChg>
-      </pc:sldChg>
       <pc:sldChg chg="add">
         <pc:chgData name="Beckerle, Mike" userId="41155a9a-513c-4288-9ceb-5c90f574ab21" providerId="ADAL" clId="{93EA92E5-423E-4026-A29C-DC3240D7B59D}" dt="2025-11-19T22:35:05.456" v="0"/>
         <pc:sldMkLst>
@@ -509,13 +347,6 @@
           <pc:sldMk cId="1843487419" sldId="412"/>
         </pc:sldMkLst>
       </pc:sldChg>
-      <pc:sldChg chg="add del">
-        <pc:chgData name="Beckerle, Mike" userId="41155a9a-513c-4288-9ceb-5c90f574ab21" providerId="ADAL" clId="{93EA92E5-423E-4026-A29C-DC3240D7B59D}" dt="2025-11-19T22:46:53.478" v="131" actId="47"/>
-        <pc:sldMkLst>
-          <pc:docMk/>
-          <pc:sldMk cId="3858124962" sldId="413"/>
-        </pc:sldMkLst>
-      </pc:sldChg>
       <pc:sldChg chg="add">
         <pc:chgData name="Beckerle, Mike" userId="41155a9a-513c-4288-9ceb-5c90f574ab21" providerId="ADAL" clId="{93EA92E5-423E-4026-A29C-DC3240D7B59D}" dt="2025-11-19T22:35:05.456" v="0"/>
         <pc:sldMkLst>
@@ -538,167 +369,6 @@
           </ac:spMkLst>
         </pc:spChg>
       </pc:sldChg>
-      <pc:sldChg chg="add del">
-        <pc:chgData name="Beckerle, Mike" userId="41155a9a-513c-4288-9ceb-5c90f574ab21" providerId="ADAL" clId="{93EA92E5-423E-4026-A29C-DC3240D7B59D}" dt="2025-11-19T22:45:03.731" v="91" actId="47"/>
-        <pc:sldMkLst>
-          <pc:docMk/>
-          <pc:sldMk cId="932363020" sldId="591"/>
-        </pc:sldMkLst>
-      </pc:sldChg>
-      <pc:sldChg chg="add del">
-        <pc:chgData name="Beckerle, Mike" userId="41155a9a-513c-4288-9ceb-5c90f574ab21" providerId="ADAL" clId="{93EA92E5-423E-4026-A29C-DC3240D7B59D}" dt="2025-11-19T22:47:08.437" v="132" actId="2696"/>
-        <pc:sldMkLst>
-          <pc:docMk/>
-          <pc:sldMk cId="200727600" sldId="600"/>
-        </pc:sldMkLst>
-      </pc:sldChg>
-      <pc:sldChg chg="add del">
-        <pc:chgData name="Beckerle, Mike" userId="41155a9a-513c-4288-9ceb-5c90f574ab21" providerId="ADAL" clId="{93EA92E5-423E-4026-A29C-DC3240D7B59D}" dt="2025-11-19T22:48:04.162" v="134" actId="2696"/>
-        <pc:sldMkLst>
-          <pc:docMk/>
-          <pc:sldMk cId="3544218029" sldId="600"/>
-        </pc:sldMkLst>
-      </pc:sldChg>
-      <pc:sldChg chg="add del">
-        <pc:chgData name="Beckerle, Mike" userId="41155a9a-513c-4288-9ceb-5c90f574ab21" providerId="ADAL" clId="{93EA92E5-423E-4026-A29C-DC3240D7B59D}" dt="2025-11-19T22:47:08.437" v="132" actId="2696"/>
-        <pc:sldMkLst>
-          <pc:docMk/>
-          <pc:sldMk cId="2083025670" sldId="601"/>
-        </pc:sldMkLst>
-      </pc:sldChg>
-      <pc:sldChg chg="add del">
-        <pc:chgData name="Beckerle, Mike" userId="41155a9a-513c-4288-9ceb-5c90f574ab21" providerId="ADAL" clId="{93EA92E5-423E-4026-A29C-DC3240D7B59D}" dt="2025-11-19T22:48:04.162" v="134" actId="2696"/>
-        <pc:sldMkLst>
-          <pc:docMk/>
-          <pc:sldMk cId="2086612165" sldId="601"/>
-        </pc:sldMkLst>
-      </pc:sldChg>
-      <pc:sldChg chg="modSp add del mod">
-        <pc:chgData name="Beckerle, Mike" userId="41155a9a-513c-4288-9ceb-5c90f574ab21" providerId="ADAL" clId="{93EA92E5-423E-4026-A29C-DC3240D7B59D}" dt="2025-11-19T22:47:08.437" v="132" actId="2696"/>
-        <pc:sldMkLst>
-          <pc:docMk/>
-          <pc:sldMk cId="1007197379" sldId="641"/>
-        </pc:sldMkLst>
-        <pc:spChg chg="mod">
-          <ac:chgData name="Beckerle, Mike" userId="41155a9a-513c-4288-9ceb-5c90f574ab21" providerId="ADAL" clId="{93EA92E5-423E-4026-A29C-DC3240D7B59D}" dt="2025-11-19T22:35:05.697" v="11" actId="27636"/>
-          <ac:spMkLst>
-            <pc:docMk/>
-            <pc:sldMk cId="1007197379" sldId="641"/>
-            <ac:spMk id="2" creationId="{00000000-0000-0000-0000-000000000000}"/>
-          </ac:spMkLst>
-        </pc:spChg>
-        <pc:spChg chg="mod">
-          <ac:chgData name="Beckerle, Mike" userId="41155a9a-513c-4288-9ceb-5c90f574ab21" providerId="ADAL" clId="{93EA92E5-423E-4026-A29C-DC3240D7B59D}" dt="2025-11-19T22:35:05.701" v="12" actId="27636"/>
-          <ac:spMkLst>
-            <pc:docMk/>
-            <pc:sldMk cId="1007197379" sldId="641"/>
-            <ac:spMk id="3" creationId="{00000000-0000-0000-0000-000000000000}"/>
-          </ac:spMkLst>
-        </pc:spChg>
-      </pc:sldChg>
-      <pc:sldChg chg="add del">
-        <pc:chgData name="Beckerle, Mike" userId="41155a9a-513c-4288-9ceb-5c90f574ab21" providerId="ADAL" clId="{93EA92E5-423E-4026-A29C-DC3240D7B59D}" dt="2025-11-19T22:48:04.162" v="134" actId="2696"/>
-        <pc:sldMkLst>
-          <pc:docMk/>
-          <pc:sldMk cId="1332962139" sldId="641"/>
-        </pc:sldMkLst>
-      </pc:sldChg>
-      <pc:sldChg chg="modSp add del mod">
-        <pc:chgData name="Beckerle, Mike" userId="41155a9a-513c-4288-9ceb-5c90f574ab21" providerId="ADAL" clId="{93EA92E5-423E-4026-A29C-DC3240D7B59D}" dt="2025-11-19T22:37:01.601" v="79" actId="47"/>
-        <pc:sldMkLst>
-          <pc:docMk/>
-          <pc:sldMk cId="3511392692" sldId="642"/>
-        </pc:sldMkLst>
-        <pc:spChg chg="mod">
-          <ac:chgData name="Beckerle, Mike" userId="41155a9a-513c-4288-9ceb-5c90f574ab21" providerId="ADAL" clId="{93EA92E5-423E-4026-A29C-DC3240D7B59D}" dt="2025-11-19T22:35:05.705" v="13" actId="27636"/>
-          <ac:spMkLst>
-            <pc:docMk/>
-            <pc:sldMk cId="3511392692" sldId="642"/>
-            <ac:spMk id="2" creationId="{939244DB-A02E-46AB-B4C0-F727E995B0E5}"/>
-          </ac:spMkLst>
-        </pc:spChg>
-      </pc:sldChg>
-      <pc:sldChg chg="modSp add del mod">
-        <pc:chgData name="Beckerle, Mike" userId="41155a9a-513c-4288-9ceb-5c90f574ab21" providerId="ADAL" clId="{93EA92E5-423E-4026-A29C-DC3240D7B59D}" dt="2025-11-19T22:36:39.451" v="78" actId="47"/>
-        <pc:sldMkLst>
-          <pc:docMk/>
-          <pc:sldMk cId="661036813" sldId="645"/>
-        </pc:sldMkLst>
-        <pc:spChg chg="mod">
-          <ac:chgData name="Beckerle, Mike" userId="41155a9a-513c-4288-9ceb-5c90f574ab21" providerId="ADAL" clId="{93EA92E5-423E-4026-A29C-DC3240D7B59D}" dt="2025-11-19T22:35:05.691" v="10" actId="27636"/>
-          <ac:spMkLst>
-            <pc:docMk/>
-            <pc:sldMk cId="661036813" sldId="645"/>
-            <ac:spMk id="17409" creationId="{3462C96A-ECCC-407A-8DA5-CACD9970FA2C}"/>
-          </ac:spMkLst>
-        </pc:spChg>
-      </pc:sldChg>
-      <pc:sldChg chg="modSp add del mod">
-        <pc:chgData name="Beckerle, Mike" userId="41155a9a-513c-4288-9ceb-5c90f574ab21" providerId="ADAL" clId="{93EA92E5-423E-4026-A29C-DC3240D7B59D}" dt="2025-11-19T22:37:01.601" v="79" actId="47"/>
-        <pc:sldMkLst>
-          <pc:docMk/>
-          <pc:sldMk cId="1067871209" sldId="649"/>
-        </pc:sldMkLst>
-        <pc:spChg chg="mod">
-          <ac:chgData name="Beckerle, Mike" userId="41155a9a-513c-4288-9ceb-5c90f574ab21" providerId="ADAL" clId="{93EA92E5-423E-4026-A29C-DC3240D7B59D}" dt="2025-11-19T22:35:05.708" v="14" actId="27636"/>
-          <ac:spMkLst>
-            <pc:docMk/>
-            <pc:sldMk cId="1067871209" sldId="649"/>
-            <ac:spMk id="2" creationId="{939244DB-A02E-46AB-B4C0-F727E995B0E5}"/>
-          </ac:spMkLst>
-        </pc:spChg>
-      </pc:sldChg>
-      <pc:sldChg chg="add del">
-        <pc:chgData name="Beckerle, Mike" userId="41155a9a-513c-4288-9ceb-5c90f574ab21" providerId="ADAL" clId="{93EA92E5-423E-4026-A29C-DC3240D7B59D}" dt="2025-11-19T22:45:03.731" v="91" actId="47"/>
-        <pc:sldMkLst>
-          <pc:docMk/>
-          <pc:sldMk cId="994380228" sldId="650"/>
-        </pc:sldMkLst>
-      </pc:sldChg>
-      <pc:sldChg chg="modSp add del mod">
-        <pc:chgData name="Beckerle, Mike" userId="41155a9a-513c-4288-9ceb-5c90f574ab21" providerId="ADAL" clId="{93EA92E5-423E-4026-A29C-DC3240D7B59D}" dt="2025-11-19T22:45:03.731" v="91" actId="47"/>
-        <pc:sldMkLst>
-          <pc:docMk/>
-          <pc:sldMk cId="669265171" sldId="651"/>
-        </pc:sldMkLst>
-        <pc:spChg chg="mod">
-          <ac:chgData name="Beckerle, Mike" userId="41155a9a-513c-4288-9ceb-5c90f574ab21" providerId="ADAL" clId="{93EA92E5-423E-4026-A29C-DC3240D7B59D}" dt="2025-11-19T22:35:06.355" v="67" actId="27636"/>
-          <ac:spMkLst>
-            <pc:docMk/>
-            <pc:sldMk cId="669265171" sldId="651"/>
-            <ac:spMk id="2" creationId="{00000000-0000-0000-0000-000000000000}"/>
-          </ac:spMkLst>
-        </pc:spChg>
-      </pc:sldChg>
-      <pc:sldChg chg="modSp add del mod">
-        <pc:chgData name="Beckerle, Mike" userId="41155a9a-513c-4288-9ceb-5c90f574ab21" providerId="ADAL" clId="{93EA92E5-423E-4026-A29C-DC3240D7B59D}" dt="2025-11-19T22:45:03.731" v="91" actId="47"/>
-        <pc:sldMkLst>
-          <pc:docMk/>
-          <pc:sldMk cId="701617414" sldId="652"/>
-        </pc:sldMkLst>
-        <pc:spChg chg="mod">
-          <ac:chgData name="Beckerle, Mike" userId="41155a9a-513c-4288-9ceb-5c90f574ab21" providerId="ADAL" clId="{93EA92E5-423E-4026-A29C-DC3240D7B59D}" dt="2025-11-19T22:35:06.359" v="68" actId="27636"/>
-          <ac:spMkLst>
-            <pc:docMk/>
-            <pc:sldMk cId="701617414" sldId="652"/>
-            <ac:spMk id="5" creationId="{B6DC8E9C-444B-4F12-9663-418BBBCCCA59}"/>
-          </ac:spMkLst>
-        </pc:spChg>
-      </pc:sldChg>
-      <pc:sldChg chg="add del">
-        <pc:chgData name="Beckerle, Mike" userId="41155a9a-513c-4288-9ceb-5c90f574ab21" providerId="ADAL" clId="{93EA92E5-423E-4026-A29C-DC3240D7B59D}" dt="2025-11-19T22:47:08.437" v="132" actId="2696"/>
-        <pc:sldMkLst>
-          <pc:docMk/>
-          <pc:sldMk cId="847452940" sldId="655"/>
-        </pc:sldMkLst>
-      </pc:sldChg>
-      <pc:sldChg chg="add del">
-        <pc:chgData name="Beckerle, Mike" userId="41155a9a-513c-4288-9ceb-5c90f574ab21" providerId="ADAL" clId="{93EA92E5-423E-4026-A29C-DC3240D7B59D}" dt="2025-11-19T22:48:04.162" v="134" actId="2696"/>
-        <pc:sldMkLst>
-          <pc:docMk/>
-          <pc:sldMk cId="1371258144" sldId="655"/>
-        </pc:sldMkLst>
-      </pc:sldChg>
       <pc:sldChg chg="add">
         <pc:chgData name="Beckerle, Mike" userId="41155a9a-513c-4288-9ceb-5c90f574ab21" providerId="ADAL" clId="{93EA92E5-423E-4026-A29C-DC3240D7B59D}" dt="2025-11-19T22:35:05.456" v="0"/>
         <pc:sldMkLst>
@@ -896,13 +566,6 @@
           <pc:sldMk cId="3331134234" sldId="674"/>
         </pc:sldMkLst>
       </pc:sldChg>
-      <pc:sldChg chg="add del">
-        <pc:chgData name="Beckerle, Mike" userId="41155a9a-513c-4288-9ceb-5c90f574ab21" providerId="ADAL" clId="{93EA92E5-423E-4026-A29C-DC3240D7B59D}" dt="2025-11-19T22:46:53.478" v="131" actId="47"/>
-        <pc:sldMkLst>
-          <pc:docMk/>
-          <pc:sldMk cId="3420989403" sldId="675"/>
-        </pc:sldMkLst>
-      </pc:sldChg>
       <pc:sldChg chg="modSp add mod">
         <pc:chgData name="Beckerle, Mike" userId="41155a9a-513c-4288-9ceb-5c90f574ab21" providerId="ADAL" clId="{93EA92E5-423E-4026-A29C-DC3240D7B59D}" dt="2025-11-19T22:35:05.933" v="32" actId="27636"/>
         <pc:sldMkLst>
@@ -918,212 +581,6 @@
           </ac:spMkLst>
         </pc:spChg>
       </pc:sldChg>
-      <pc:sldChg chg="add del">
-        <pc:chgData name="Beckerle, Mike" userId="41155a9a-513c-4288-9ceb-5c90f574ab21" providerId="ADAL" clId="{93EA92E5-423E-4026-A29C-DC3240D7B59D}" dt="2025-11-19T22:45:03.731" v="91" actId="47"/>
-        <pc:sldMkLst>
-          <pc:docMk/>
-          <pc:sldMk cId="645821479" sldId="677"/>
-        </pc:sldMkLst>
-      </pc:sldChg>
-      <pc:sldChg chg="add del">
-        <pc:chgData name="Beckerle, Mike" userId="41155a9a-513c-4288-9ceb-5c90f574ab21" providerId="ADAL" clId="{93EA92E5-423E-4026-A29C-DC3240D7B59D}" dt="2025-11-19T22:37:01.601" v="79" actId="47"/>
-        <pc:sldMkLst>
-          <pc:docMk/>
-          <pc:sldMk cId="2076813666" sldId="678"/>
-        </pc:sldMkLst>
-      </pc:sldChg>
-      <pc:sldChg chg="add del">
-        <pc:chgData name="Beckerle, Mike" userId="41155a9a-513c-4288-9ceb-5c90f574ab21" providerId="ADAL" clId="{93EA92E5-423E-4026-A29C-DC3240D7B59D}" dt="2025-11-19T22:37:01.601" v="79" actId="47"/>
-        <pc:sldMkLst>
-          <pc:docMk/>
-          <pc:sldMk cId="1738767488" sldId="679"/>
-        </pc:sldMkLst>
-      </pc:sldChg>
-      <pc:sldChg chg="add del">
-        <pc:chgData name="Beckerle, Mike" userId="41155a9a-513c-4288-9ceb-5c90f574ab21" providerId="ADAL" clId="{93EA92E5-423E-4026-A29C-DC3240D7B59D}" dt="2025-11-19T22:37:01.601" v="79" actId="47"/>
-        <pc:sldMkLst>
-          <pc:docMk/>
-          <pc:sldMk cId="739616997" sldId="680"/>
-        </pc:sldMkLst>
-      </pc:sldChg>
-      <pc:sldChg chg="modSp add del mod">
-        <pc:chgData name="Beckerle, Mike" userId="41155a9a-513c-4288-9ceb-5c90f574ab21" providerId="ADAL" clId="{93EA92E5-423E-4026-A29C-DC3240D7B59D}" dt="2025-11-19T22:37:01.601" v="79" actId="47"/>
-        <pc:sldMkLst>
-          <pc:docMk/>
-          <pc:sldMk cId="3822403366" sldId="681"/>
-        </pc:sldMkLst>
-        <pc:spChg chg="mod">
-          <ac:chgData name="Beckerle, Mike" userId="41155a9a-513c-4288-9ceb-5c90f574ab21" providerId="ADAL" clId="{93EA92E5-423E-4026-A29C-DC3240D7B59D}" dt="2025-11-19T22:35:05.737" v="15" actId="27636"/>
-          <ac:spMkLst>
-            <pc:docMk/>
-            <pc:sldMk cId="3822403366" sldId="681"/>
-            <ac:spMk id="7" creationId="{C02D8E40-62AC-A6E9-4A6E-A7790B61F603}"/>
-          </ac:spMkLst>
-        </pc:spChg>
-      </pc:sldChg>
-      <pc:sldChg chg="add del">
-        <pc:chgData name="Beckerle, Mike" userId="41155a9a-513c-4288-9ceb-5c90f574ab21" providerId="ADAL" clId="{93EA92E5-423E-4026-A29C-DC3240D7B59D}" dt="2025-11-19T22:37:01.601" v="79" actId="47"/>
-        <pc:sldMkLst>
-          <pc:docMk/>
-          <pc:sldMk cId="1070422939" sldId="682"/>
-        </pc:sldMkLst>
-      </pc:sldChg>
-      <pc:sldChg chg="modSp add del mod">
-        <pc:chgData name="Beckerle, Mike" userId="41155a9a-513c-4288-9ceb-5c90f574ab21" providerId="ADAL" clId="{93EA92E5-423E-4026-A29C-DC3240D7B59D}" dt="2025-11-19T22:37:01.601" v="79" actId="47"/>
-        <pc:sldMkLst>
-          <pc:docMk/>
-          <pc:sldMk cId="2929142988" sldId="683"/>
-        </pc:sldMkLst>
-        <pc:spChg chg="mod">
-          <ac:chgData name="Beckerle, Mike" userId="41155a9a-513c-4288-9ceb-5c90f574ab21" providerId="ADAL" clId="{93EA92E5-423E-4026-A29C-DC3240D7B59D}" dt="2025-11-19T22:35:05.746" v="16" actId="27636"/>
-          <ac:spMkLst>
-            <pc:docMk/>
-            <pc:sldMk cId="2929142988" sldId="683"/>
-            <ac:spMk id="7" creationId="{C02D8E40-62AC-A6E9-4A6E-A7790B61F603}"/>
-          </ac:spMkLst>
-        </pc:spChg>
-      </pc:sldChg>
-      <pc:sldChg chg="modSp add del mod">
-        <pc:chgData name="Beckerle, Mike" userId="41155a9a-513c-4288-9ceb-5c90f574ab21" providerId="ADAL" clId="{93EA92E5-423E-4026-A29C-DC3240D7B59D}" dt="2025-11-19T22:37:01.601" v="79" actId="47"/>
-        <pc:sldMkLst>
-          <pc:docMk/>
-          <pc:sldMk cId="3233718103" sldId="684"/>
-        </pc:sldMkLst>
-        <pc:spChg chg="mod">
-          <ac:chgData name="Beckerle, Mike" userId="41155a9a-513c-4288-9ceb-5c90f574ab21" providerId="ADAL" clId="{93EA92E5-423E-4026-A29C-DC3240D7B59D}" dt="2025-11-19T22:35:05.852" v="24" actId="27636"/>
-          <ac:spMkLst>
-            <pc:docMk/>
-            <pc:sldMk cId="3233718103" sldId="684"/>
-            <ac:spMk id="7" creationId="{C02D8E40-62AC-A6E9-4A6E-A7790B61F603}"/>
-          </ac:spMkLst>
-        </pc:spChg>
-      </pc:sldChg>
-      <pc:sldChg chg="modSp add del mod">
-        <pc:chgData name="Beckerle, Mike" userId="41155a9a-513c-4288-9ceb-5c90f574ab21" providerId="ADAL" clId="{93EA92E5-423E-4026-A29C-DC3240D7B59D}" dt="2025-11-19T22:37:01.601" v="79" actId="47"/>
-        <pc:sldMkLst>
-          <pc:docMk/>
-          <pc:sldMk cId="4289599251" sldId="685"/>
-        </pc:sldMkLst>
-        <pc:spChg chg="mod">
-          <ac:chgData name="Beckerle, Mike" userId="41155a9a-513c-4288-9ceb-5c90f574ab21" providerId="ADAL" clId="{93EA92E5-423E-4026-A29C-DC3240D7B59D}" dt="2025-11-19T22:35:05.844" v="23" actId="27636"/>
-          <ac:spMkLst>
-            <pc:docMk/>
-            <pc:sldMk cId="4289599251" sldId="685"/>
-            <ac:spMk id="7" creationId="{C02D8E40-62AC-A6E9-4A6E-A7790B61F603}"/>
-          </ac:spMkLst>
-        </pc:spChg>
-      </pc:sldChg>
-      <pc:sldChg chg="modSp add del mod">
-        <pc:chgData name="Beckerle, Mike" userId="41155a9a-513c-4288-9ceb-5c90f574ab21" providerId="ADAL" clId="{93EA92E5-423E-4026-A29C-DC3240D7B59D}" dt="2025-11-19T22:37:01.601" v="79" actId="47"/>
-        <pc:sldMkLst>
-          <pc:docMk/>
-          <pc:sldMk cId="848548615" sldId="686"/>
-        </pc:sldMkLst>
-        <pc:spChg chg="mod">
-          <ac:chgData name="Beckerle, Mike" userId="41155a9a-513c-4288-9ceb-5c90f574ab21" providerId="ADAL" clId="{93EA92E5-423E-4026-A29C-DC3240D7B59D}" dt="2025-11-19T22:35:05.865" v="25" actId="27636"/>
-          <ac:spMkLst>
-            <pc:docMk/>
-            <pc:sldMk cId="848548615" sldId="686"/>
-            <ac:spMk id="7" creationId="{C02D8E40-62AC-A6E9-4A6E-A7790B61F603}"/>
-          </ac:spMkLst>
-        </pc:spChg>
-      </pc:sldChg>
-      <pc:sldChg chg="add del">
-        <pc:chgData name="Beckerle, Mike" userId="41155a9a-513c-4288-9ceb-5c90f574ab21" providerId="ADAL" clId="{93EA92E5-423E-4026-A29C-DC3240D7B59D}" dt="2025-11-19T22:37:01.601" v="79" actId="47"/>
-        <pc:sldMkLst>
-          <pc:docMk/>
-          <pc:sldMk cId="1045210239" sldId="687"/>
-        </pc:sldMkLst>
-      </pc:sldChg>
-      <pc:sldChg chg="add del">
-        <pc:chgData name="Beckerle, Mike" userId="41155a9a-513c-4288-9ceb-5c90f574ab21" providerId="ADAL" clId="{93EA92E5-423E-4026-A29C-DC3240D7B59D}" dt="2025-11-19T22:37:01.601" v="79" actId="47"/>
-        <pc:sldMkLst>
-          <pc:docMk/>
-          <pc:sldMk cId="1015352574" sldId="688"/>
-        </pc:sldMkLst>
-      </pc:sldChg>
-      <pc:sldChg chg="modSp add del mod">
-        <pc:chgData name="Beckerle, Mike" userId="41155a9a-513c-4288-9ceb-5c90f574ab21" providerId="ADAL" clId="{93EA92E5-423E-4026-A29C-DC3240D7B59D}" dt="2025-11-19T22:37:01.601" v="79" actId="47"/>
-        <pc:sldMkLst>
-          <pc:docMk/>
-          <pc:sldMk cId="1846706429" sldId="690"/>
-        </pc:sldMkLst>
-        <pc:spChg chg="mod">
-          <ac:chgData name="Beckerle, Mike" userId="41155a9a-513c-4288-9ceb-5c90f574ab21" providerId="ADAL" clId="{93EA92E5-423E-4026-A29C-DC3240D7B59D}" dt="2025-11-19T22:35:05.794" v="19" actId="27636"/>
-          <ac:spMkLst>
-            <pc:docMk/>
-            <pc:sldMk cId="1846706429" sldId="690"/>
-            <ac:spMk id="7" creationId="{C02D8E40-62AC-A6E9-4A6E-A7790B61F603}"/>
-          </ac:spMkLst>
-        </pc:spChg>
-      </pc:sldChg>
-      <pc:sldChg chg="modSp add del mod">
-        <pc:chgData name="Beckerle, Mike" userId="41155a9a-513c-4288-9ceb-5c90f574ab21" providerId="ADAL" clId="{93EA92E5-423E-4026-A29C-DC3240D7B59D}" dt="2025-11-19T22:37:01.601" v="79" actId="47"/>
-        <pc:sldMkLst>
-          <pc:docMk/>
-          <pc:sldMk cId="3353847969" sldId="691"/>
-        </pc:sldMkLst>
-        <pc:spChg chg="mod">
-          <ac:chgData name="Beckerle, Mike" userId="41155a9a-513c-4288-9ceb-5c90f574ab21" providerId="ADAL" clId="{93EA92E5-423E-4026-A29C-DC3240D7B59D}" dt="2025-11-19T22:35:05.871" v="26" actId="27636"/>
-          <ac:spMkLst>
-            <pc:docMk/>
-            <pc:sldMk cId="3353847969" sldId="691"/>
-            <ac:spMk id="7" creationId="{6697A60B-E271-3F85-D864-34027C49011F}"/>
-          </ac:spMkLst>
-        </pc:spChg>
-      </pc:sldChg>
-      <pc:sldChg chg="modSp add del mod">
-        <pc:chgData name="Beckerle, Mike" userId="41155a9a-513c-4288-9ceb-5c90f574ab21" providerId="ADAL" clId="{93EA92E5-423E-4026-A29C-DC3240D7B59D}" dt="2025-11-19T22:37:01.601" v="79" actId="47"/>
-        <pc:sldMkLst>
-          <pc:docMk/>
-          <pc:sldMk cId="1811338136" sldId="692"/>
-        </pc:sldMkLst>
-        <pc:spChg chg="mod">
-          <ac:chgData name="Beckerle, Mike" userId="41155a9a-513c-4288-9ceb-5c90f574ab21" providerId="ADAL" clId="{93EA92E5-423E-4026-A29C-DC3240D7B59D}" dt="2025-11-19T22:35:05.876" v="27" actId="27636"/>
-          <ac:spMkLst>
-            <pc:docMk/>
-            <pc:sldMk cId="1811338136" sldId="692"/>
-            <ac:spMk id="7" creationId="{6697A60B-E271-3F85-D864-34027C49011F}"/>
-          </ac:spMkLst>
-        </pc:spChg>
-      </pc:sldChg>
-      <pc:sldChg chg="add del">
-        <pc:chgData name="Beckerle, Mike" userId="41155a9a-513c-4288-9ceb-5c90f574ab21" providerId="ADAL" clId="{93EA92E5-423E-4026-A29C-DC3240D7B59D}" dt="2025-11-19T22:37:01.601" v="79" actId="47"/>
-        <pc:sldMkLst>
-          <pc:docMk/>
-          <pc:sldMk cId="4118899515" sldId="693"/>
-        </pc:sldMkLst>
-      </pc:sldChg>
-      <pc:sldChg chg="modSp add del mod">
-        <pc:chgData name="Beckerle, Mike" userId="41155a9a-513c-4288-9ceb-5c90f574ab21" providerId="ADAL" clId="{93EA92E5-423E-4026-A29C-DC3240D7B59D}" dt="2025-11-19T22:37:01.601" v="79" actId="47"/>
-        <pc:sldMkLst>
-          <pc:docMk/>
-          <pc:sldMk cId="4249528946" sldId="694"/>
-        </pc:sldMkLst>
-        <pc:spChg chg="mod">
-          <ac:chgData name="Beckerle, Mike" userId="41155a9a-513c-4288-9ceb-5c90f574ab21" providerId="ADAL" clId="{93EA92E5-423E-4026-A29C-DC3240D7B59D}" dt="2025-11-19T22:35:05.885" v="28" actId="27636"/>
-          <ac:spMkLst>
-            <pc:docMk/>
-            <pc:sldMk cId="4249528946" sldId="694"/>
-            <ac:spMk id="2" creationId="{E3C3D1E2-74C5-DB3B-6916-FF822393A84C}"/>
-          </ac:spMkLst>
-        </pc:spChg>
-      </pc:sldChg>
-      <pc:sldChg chg="modSp add del mod">
-        <pc:chgData name="Beckerle, Mike" userId="41155a9a-513c-4288-9ceb-5c90f574ab21" providerId="ADAL" clId="{93EA92E5-423E-4026-A29C-DC3240D7B59D}" dt="2025-11-19T22:37:01.601" v="79" actId="47"/>
-        <pc:sldMkLst>
-          <pc:docMk/>
-          <pc:sldMk cId="4071866818" sldId="695"/>
-        </pc:sldMkLst>
-        <pc:spChg chg="mod">
-          <ac:chgData name="Beckerle, Mike" userId="41155a9a-513c-4288-9ceb-5c90f574ab21" providerId="ADAL" clId="{93EA92E5-423E-4026-A29C-DC3240D7B59D}" dt="2025-11-19T22:35:05.903" v="30" actId="27636"/>
-          <ac:spMkLst>
-            <pc:docMk/>
-            <pc:sldMk cId="4071866818" sldId="695"/>
-            <ac:spMk id="7" creationId="{A1380E75-D418-AA44-3721-8423B340819B}"/>
-          </ac:spMkLst>
-        </pc:spChg>
-      </pc:sldChg>
       <pc:sldChg chg="modSp add mod">
         <pc:chgData name="Beckerle, Mike" userId="41155a9a-513c-4288-9ceb-5c90f574ab21" providerId="ADAL" clId="{93EA92E5-423E-4026-A29C-DC3240D7B59D}" dt="2025-11-19T22:35:05.962" v="34" actId="27636"/>
         <pc:sldMkLst>
@@ -1153,51 +610,6 @@
           <pc:sldMk cId="2774650224" sldId="698"/>
         </pc:sldMkLst>
       </pc:sldChg>
-      <pc:sldChg chg="modSp add del mod">
-        <pc:chgData name="Beckerle, Mike" userId="41155a9a-513c-4288-9ceb-5c90f574ab21" providerId="ADAL" clId="{93EA92E5-423E-4026-A29C-DC3240D7B59D}" dt="2025-11-19T22:46:53.478" v="131" actId="47"/>
-        <pc:sldMkLst>
-          <pc:docMk/>
-          <pc:sldMk cId="1337795647" sldId="699"/>
-        </pc:sldMkLst>
-        <pc:spChg chg="mod">
-          <ac:chgData name="Beckerle, Mike" userId="41155a9a-513c-4288-9ceb-5c90f574ab21" providerId="ADAL" clId="{93EA92E5-423E-4026-A29C-DC3240D7B59D}" dt="2025-11-19T22:35:06.313" v="61" actId="27636"/>
-          <ac:spMkLst>
-            <pc:docMk/>
-            <pc:sldMk cId="1337795647" sldId="699"/>
-            <ac:spMk id="2" creationId="{B0991D17-63CF-42A0-A03E-736DA156A928}"/>
-          </ac:spMkLst>
-        </pc:spChg>
-      </pc:sldChg>
-      <pc:sldChg chg="modSp add del mod">
-        <pc:chgData name="Beckerle, Mike" userId="41155a9a-513c-4288-9ceb-5c90f574ab21" providerId="ADAL" clId="{93EA92E5-423E-4026-A29C-DC3240D7B59D}" dt="2025-11-19T22:37:01.601" v="79" actId="47"/>
-        <pc:sldMkLst>
-          <pc:docMk/>
-          <pc:sldMk cId="4263591225" sldId="700"/>
-        </pc:sldMkLst>
-        <pc:spChg chg="mod">
-          <ac:chgData name="Beckerle, Mike" userId="41155a9a-513c-4288-9ceb-5c90f574ab21" providerId="ADAL" clId="{93EA92E5-423E-4026-A29C-DC3240D7B59D}" dt="2025-11-19T22:35:05.755" v="17" actId="27636"/>
-          <ac:spMkLst>
-            <pc:docMk/>
-            <pc:sldMk cId="4263591225" sldId="700"/>
-            <ac:spMk id="7" creationId="{C02D8E40-62AC-A6E9-4A6E-A7790B61F603}"/>
-          </ac:spMkLst>
-        </pc:spChg>
-      </pc:sldChg>
-      <pc:sldChg chg="modSp add del mod">
-        <pc:chgData name="Beckerle, Mike" userId="41155a9a-513c-4288-9ceb-5c90f574ab21" providerId="ADAL" clId="{93EA92E5-423E-4026-A29C-DC3240D7B59D}" dt="2025-11-19T22:37:01.601" v="79" actId="47"/>
-        <pc:sldMkLst>
-          <pc:docMk/>
-          <pc:sldMk cId="3369103685" sldId="701"/>
-        </pc:sldMkLst>
-        <pc:spChg chg="mod">
-          <ac:chgData name="Beckerle, Mike" userId="41155a9a-513c-4288-9ceb-5c90f574ab21" providerId="ADAL" clId="{93EA92E5-423E-4026-A29C-DC3240D7B59D}" dt="2025-11-19T22:35:05.773" v="18" actId="27636"/>
-          <ac:spMkLst>
-            <pc:docMk/>
-            <pc:sldMk cId="3369103685" sldId="701"/>
-            <ac:spMk id="7" creationId="{C02D8E40-62AC-A6E9-4A6E-A7790B61F603}"/>
-          </ac:spMkLst>
-        </pc:spChg>
-      </pc:sldChg>
       <pc:sldChg chg="modSp add mod">
         <pc:chgData name="Beckerle, Mike" userId="41155a9a-513c-4288-9ceb-5c90f574ab21" providerId="ADAL" clId="{93EA92E5-423E-4026-A29C-DC3240D7B59D}" dt="2025-11-19T22:35:05.600" v="3" actId="27636"/>
         <pc:sldMkLst>
@@ -1244,28 +656,6 @@
           </ac:spMkLst>
         </pc:spChg>
       </pc:sldChg>
-      <pc:sldChg chg="add del">
-        <pc:chgData name="Beckerle, Mike" userId="41155a9a-513c-4288-9ceb-5c90f574ab21" providerId="ADAL" clId="{93EA92E5-423E-4026-A29C-DC3240D7B59D}" dt="2025-11-19T22:37:01.601" v="79" actId="47"/>
-        <pc:sldMkLst>
-          <pc:docMk/>
-          <pc:sldMk cId="2042002574" sldId="705"/>
-        </pc:sldMkLst>
-      </pc:sldChg>
-      <pc:sldChg chg="modSp add del mod">
-        <pc:chgData name="Beckerle, Mike" userId="41155a9a-513c-4288-9ceb-5c90f574ab21" providerId="ADAL" clId="{93EA92E5-423E-4026-A29C-DC3240D7B59D}" dt="2025-11-19T22:37:01.601" v="79" actId="47"/>
-        <pc:sldMkLst>
-          <pc:docMk/>
-          <pc:sldMk cId="1679911288" sldId="706"/>
-        </pc:sldMkLst>
-        <pc:spChg chg="mod">
-          <ac:chgData name="Beckerle, Mike" userId="41155a9a-513c-4288-9ceb-5c90f574ab21" providerId="ADAL" clId="{93EA92E5-423E-4026-A29C-DC3240D7B59D}" dt="2025-11-19T22:35:05.894" v="29" actId="27636"/>
-          <ac:spMkLst>
-            <pc:docMk/>
-            <pc:sldMk cId="1679911288" sldId="706"/>
-            <ac:spMk id="10" creationId="{E71D2986-CE49-6FF0-342E-05C21394F8E9}"/>
-          </ac:spMkLst>
-        </pc:spChg>
-      </pc:sldChg>
       <pc:sldChg chg="add">
         <pc:chgData name="Beckerle, Mike" userId="41155a9a-513c-4288-9ceb-5c90f574ab21" providerId="ADAL" clId="{93EA92E5-423E-4026-A29C-DC3240D7B59D}" dt="2025-11-19T22:35:05.456" v="0"/>
         <pc:sldMkLst>
@@ -1303,13 +693,6 @@
           </ac:spMkLst>
         </pc:spChg>
       </pc:sldChg>
-      <pc:sldChg chg="add del">
-        <pc:chgData name="Beckerle, Mike" userId="41155a9a-513c-4288-9ceb-5c90f574ab21" providerId="ADAL" clId="{93EA92E5-423E-4026-A29C-DC3240D7B59D}" dt="2025-11-19T22:37:01.601" v="79" actId="47"/>
-        <pc:sldMkLst>
-          <pc:docMk/>
-          <pc:sldMk cId="393025175" sldId="711"/>
-        </pc:sldMkLst>
-      </pc:sldChg>
       <pc:sldChg chg="add">
         <pc:chgData name="Beckerle, Mike" userId="41155a9a-513c-4288-9ceb-5c90f574ab21" providerId="ADAL" clId="{93EA92E5-423E-4026-A29C-DC3240D7B59D}" dt="2025-11-19T22:35:05.456" v="0"/>
         <pc:sldMkLst>
@@ -1317,19 +700,67 @@
           <pc:sldMk cId="3901194083" sldId="713"/>
         </pc:sldMkLst>
       </pc:sldChg>
-      <pc:sldChg chg="add">
-        <pc:chgData name="Beckerle, Mike" userId="41155a9a-513c-4288-9ceb-5c90f574ab21" providerId="ADAL" clId="{93EA92E5-423E-4026-A29C-DC3240D7B59D}" dt="2025-11-19T22:35:05.456" v="0"/>
+      <pc:sldChg chg="modSp add mod">
+        <pc:chgData name="Beckerle, Mike" userId="41155a9a-513c-4288-9ceb-5c90f574ab21" providerId="ADAL" clId="{93EA92E5-423E-4026-A29C-DC3240D7B59D}" dt="2025-11-24T21:53:26.328" v="313" actId="20577"/>
         <pc:sldMkLst>
           <pc:docMk/>
           <pc:sldMk cId="1040463608" sldId="715"/>
         </pc:sldMkLst>
-      </pc:sldChg>
-      <pc:sldChg chg="add">
-        <pc:chgData name="Beckerle, Mike" userId="41155a9a-513c-4288-9ceb-5c90f574ab21" providerId="ADAL" clId="{93EA92E5-423E-4026-A29C-DC3240D7B59D}" dt="2025-11-19T22:35:05.456" v="0"/>
+        <pc:spChg chg="mod">
+          <ac:chgData name="Beckerle, Mike" userId="41155a9a-513c-4288-9ceb-5c90f574ab21" providerId="ADAL" clId="{93EA92E5-423E-4026-A29C-DC3240D7B59D}" dt="2025-11-24T21:53:26.328" v="313" actId="20577"/>
+          <ac:spMkLst>
+            <pc:docMk/>
+            <pc:sldMk cId="1040463608" sldId="715"/>
+            <ac:spMk id="3" creationId="{ABC8D2A6-CF07-4F40-B64D-D65D4C85366B}"/>
+          </ac:spMkLst>
+        </pc:spChg>
+        <pc:spChg chg="mod">
+          <ac:chgData name="Beckerle, Mike" userId="41155a9a-513c-4288-9ceb-5c90f574ab21" providerId="ADAL" clId="{93EA92E5-423E-4026-A29C-DC3240D7B59D}" dt="2025-11-24T21:52:57.806" v="307" actId="207"/>
+          <ac:spMkLst>
+            <pc:docMk/>
+            <pc:sldMk cId="1040463608" sldId="715"/>
+            <ac:spMk id="4" creationId="{DC70F61D-7C36-462F-54A4-44A20C85B100}"/>
+          </ac:spMkLst>
+        </pc:spChg>
+        <pc:spChg chg="mod">
+          <ac:chgData name="Beckerle, Mike" userId="41155a9a-513c-4288-9ceb-5c90f574ab21" providerId="ADAL" clId="{93EA92E5-423E-4026-A29C-DC3240D7B59D}" dt="2025-11-24T21:52:57.806" v="307" actId="207"/>
+          <ac:spMkLst>
+            <pc:docMk/>
+            <pc:sldMk cId="1040463608" sldId="715"/>
+            <ac:spMk id="5" creationId="{3C866645-D980-D912-1BBB-3EEEA952F585}"/>
+          </ac:spMkLst>
+        </pc:spChg>
+      </pc:sldChg>
+      <pc:sldChg chg="modSp add mod">
+        <pc:chgData name="Beckerle, Mike" userId="41155a9a-513c-4288-9ceb-5c90f574ab21" providerId="ADAL" clId="{93EA92E5-423E-4026-A29C-DC3240D7B59D}" dt="2025-11-24T21:52:19.034" v="300" actId="207"/>
         <pc:sldMkLst>
           <pc:docMk/>
           <pc:sldMk cId="71910208" sldId="716"/>
         </pc:sldMkLst>
+        <pc:spChg chg="mod">
+          <ac:chgData name="Beckerle, Mike" userId="41155a9a-513c-4288-9ceb-5c90f574ab21" providerId="ADAL" clId="{93EA92E5-423E-4026-A29C-DC3240D7B59D}" dt="2025-11-24T21:47:28.278" v="289" actId="113"/>
+          <ac:spMkLst>
+            <pc:docMk/>
+            <pc:sldMk cId="71910208" sldId="716"/>
+            <ac:spMk id="3" creationId="{ABC8D2A6-CF07-4F40-B64D-D65D4C85366B}"/>
+          </ac:spMkLst>
+        </pc:spChg>
+        <pc:spChg chg="mod">
+          <ac:chgData name="Beckerle, Mike" userId="41155a9a-513c-4288-9ceb-5c90f574ab21" providerId="ADAL" clId="{93EA92E5-423E-4026-A29C-DC3240D7B59D}" dt="2025-11-24T21:52:19.034" v="300" actId="207"/>
+          <ac:spMkLst>
+            <pc:docMk/>
+            <pc:sldMk cId="71910208" sldId="716"/>
+            <ac:spMk id="4" creationId="{DC70F61D-7C36-462F-54A4-44A20C85B100}"/>
+          </ac:spMkLst>
+        </pc:spChg>
+        <pc:spChg chg="mod">
+          <ac:chgData name="Beckerle, Mike" userId="41155a9a-513c-4288-9ceb-5c90f574ab21" providerId="ADAL" clId="{93EA92E5-423E-4026-A29C-DC3240D7B59D}" dt="2025-11-24T21:52:11.602" v="299" actId="207"/>
+          <ac:spMkLst>
+            <pc:docMk/>
+            <pc:sldMk cId="71910208" sldId="716"/>
+            <ac:spMk id="5" creationId="{3C866645-D980-D912-1BBB-3EEEA952F585}"/>
+          </ac:spMkLst>
+        </pc:spChg>
       </pc:sldChg>
       <pc:sldChg chg="modSp add mod">
         <pc:chgData name="Beckerle, Mike" userId="41155a9a-513c-4288-9ceb-5c90f574ab21" providerId="ADAL" clId="{93EA92E5-423E-4026-A29C-DC3240D7B59D}" dt="2025-11-19T22:35:06.189" v="54" actId="27636"/>
@@ -1390,94 +821,12 @@
           <pc:sldMk cId="3273319299" sldId="721"/>
         </pc:sldMkLst>
       </pc:sldChg>
-      <pc:sldChg chg="modSp add del mod">
-        <pc:chgData name="Beckerle, Mike" userId="41155a9a-513c-4288-9ceb-5c90f574ab21" providerId="ADAL" clId="{93EA92E5-423E-4026-A29C-DC3240D7B59D}" dt="2025-11-19T22:37:01.601" v="79" actId="47"/>
-        <pc:sldMkLst>
-          <pc:docMk/>
-          <pc:sldMk cId="2097226461" sldId="722"/>
-        </pc:sldMkLst>
-        <pc:spChg chg="mod">
-          <ac:chgData name="Beckerle, Mike" userId="41155a9a-513c-4288-9ceb-5c90f574ab21" providerId="ADAL" clId="{93EA92E5-423E-4026-A29C-DC3240D7B59D}" dt="2025-11-19T22:35:05.833" v="22" actId="27636"/>
-          <ac:spMkLst>
-            <pc:docMk/>
-            <pc:sldMk cId="2097226461" sldId="722"/>
-            <ac:spMk id="4" creationId="{458BBFA7-E1D3-3EC5-88A0-885EF9F604BB}"/>
-          </ac:spMkLst>
-        </pc:spChg>
-        <pc:spChg chg="mod">
-          <ac:chgData name="Beckerle, Mike" userId="41155a9a-513c-4288-9ceb-5c90f574ab21" providerId="ADAL" clId="{93EA92E5-423E-4026-A29C-DC3240D7B59D}" dt="2025-11-19T22:35:05.828" v="21" actId="27636"/>
-          <ac:spMkLst>
-            <pc:docMk/>
-            <pc:sldMk cId="2097226461" sldId="722"/>
-            <ac:spMk id="6" creationId="{31F8F998-7E79-40A5-A0C2-CB8B33B36FD1}"/>
-          </ac:spMkLst>
-        </pc:spChg>
-      </pc:sldChg>
-      <pc:sldChg chg="modSp add del mod">
-        <pc:chgData name="Beckerle, Mike" userId="41155a9a-513c-4288-9ceb-5c90f574ab21" providerId="ADAL" clId="{93EA92E5-423E-4026-A29C-DC3240D7B59D}" dt="2025-11-19T22:37:01.601" v="79" actId="47"/>
-        <pc:sldMkLst>
-          <pc:docMk/>
-          <pc:sldMk cId="3687969129" sldId="723"/>
-        </pc:sldMkLst>
-        <pc:spChg chg="mod">
-          <ac:chgData name="Beckerle, Mike" userId="41155a9a-513c-4288-9ceb-5c90f574ab21" providerId="ADAL" clId="{93EA92E5-423E-4026-A29C-DC3240D7B59D}" dt="2025-11-19T22:35:05.823" v="20" actId="27636"/>
-          <ac:spMkLst>
-            <pc:docMk/>
-            <pc:sldMk cId="3687969129" sldId="723"/>
-            <ac:spMk id="6" creationId="{2F88AF1D-6B13-D720-166C-D145F013672E}"/>
-          </ac:spMkLst>
-        </pc:spChg>
-      </pc:sldChg>
-      <pc:sldChg chg="add del">
-        <pc:chgData name="Beckerle, Mike" userId="41155a9a-513c-4288-9ceb-5c90f574ab21" providerId="ADAL" clId="{93EA92E5-423E-4026-A29C-DC3240D7B59D}" dt="2025-11-19T22:37:01.601" v="79" actId="47"/>
-        <pc:sldMkLst>
-          <pc:docMk/>
-          <pc:sldMk cId="700850256" sldId="724"/>
-        </pc:sldMkLst>
-      </pc:sldChg>
       <pc:sldChg chg="add">
         <pc:chgData name="Beckerle, Mike" userId="41155a9a-513c-4288-9ceb-5c90f574ab21" providerId="ADAL" clId="{93EA92E5-423E-4026-A29C-DC3240D7B59D}" dt="2025-11-19T22:35:05.456" v="0"/>
         <pc:sldMkLst>
           <pc:docMk/>
           <pc:sldMk cId="2824161559" sldId="725"/>
         </pc:sldMkLst>
-      </pc:sldChg>
-      <pc:sldChg chg="add del">
-        <pc:chgData name="Beckerle, Mike" userId="41155a9a-513c-4288-9ceb-5c90f574ab21" providerId="ADAL" clId="{93EA92E5-423E-4026-A29C-DC3240D7B59D}" dt="2025-11-19T22:37:01.601" v="79" actId="47"/>
-        <pc:sldMkLst>
-          <pc:docMk/>
-          <pc:sldMk cId="2078117700" sldId="726"/>
-        </pc:sldMkLst>
-      </pc:sldChg>
-      <pc:sldChg chg="modSp add del mod">
-        <pc:chgData name="Beckerle, Mike" userId="41155a9a-513c-4288-9ceb-5c90f574ab21" providerId="ADAL" clId="{93EA92E5-423E-4026-A29C-DC3240D7B59D}" dt="2025-11-19T22:50:26.627" v="136" actId="2696"/>
-        <pc:sldMkLst>
-          <pc:docMk/>
-          <pc:sldMk cId="1521174156" sldId="727"/>
-        </pc:sldMkLst>
-        <pc:spChg chg="mod">
-          <ac:chgData name="Beckerle, Mike" userId="41155a9a-513c-4288-9ceb-5c90f574ab21" providerId="ADAL" clId="{93EA92E5-423E-4026-A29C-DC3240D7B59D}" dt="2025-11-19T22:35:06.343" v="64" actId="27636"/>
-          <ac:spMkLst>
-            <pc:docMk/>
-            <pc:sldMk cId="1521174156" sldId="727"/>
-            <ac:spMk id="4" creationId="{2E9E51FB-55E1-301E-64E9-802C6FA5FA3D}"/>
-          </ac:spMkLst>
-        </pc:spChg>
-      </pc:sldChg>
-      <pc:sldChg chg="modSp add del mod">
-        <pc:chgData name="Beckerle, Mike" userId="41155a9a-513c-4288-9ceb-5c90f574ab21" providerId="ADAL" clId="{93EA92E5-423E-4026-A29C-DC3240D7B59D}" dt="2025-11-19T22:53:21.051" v="137" actId="2696"/>
-        <pc:sldMkLst>
-          <pc:docMk/>
-          <pc:sldMk cId="1357797443" sldId="728"/>
-        </pc:sldMkLst>
-        <pc:spChg chg="mod">
-          <ac:chgData name="Beckerle, Mike" userId="41155a9a-513c-4288-9ceb-5c90f574ab21" providerId="ADAL" clId="{93EA92E5-423E-4026-A29C-DC3240D7B59D}" dt="2025-11-19T22:35:06.351" v="66" actId="27636"/>
-          <ac:spMkLst>
-            <pc:docMk/>
-            <pc:sldMk cId="1357797443" sldId="728"/>
-            <ac:spMk id="15382" creationId="{00000000-0000-0000-0000-000000000000}"/>
-          </ac:spMkLst>
-        </pc:spChg>
       </pc:sldChg>
       <pc:sldChg chg="add">
         <pc:chgData name="Beckerle, Mike" userId="41155a9a-513c-4288-9ceb-5c90f574ab21" providerId="ADAL" clId="{93EA92E5-423E-4026-A29C-DC3240D7B59D}" dt="2025-11-19T22:35:05.456" v="0"/>
@@ -1523,20 +872,6 @@
           </ac:spMkLst>
         </pc:spChg>
       </pc:sldChg>
-      <pc:sldChg chg="add del">
-        <pc:chgData name="Beckerle, Mike" userId="41155a9a-513c-4288-9ceb-5c90f574ab21" providerId="ADAL" clId="{93EA92E5-423E-4026-A29C-DC3240D7B59D}" dt="2025-11-19T22:50:26.627" v="136" actId="2696"/>
-        <pc:sldMkLst>
-          <pc:docMk/>
-          <pc:sldMk cId="3362108642" sldId="733"/>
-        </pc:sldMkLst>
-      </pc:sldChg>
-      <pc:sldChg chg="add del">
-        <pc:chgData name="Beckerle, Mike" userId="41155a9a-513c-4288-9ceb-5c90f574ab21" providerId="ADAL" clId="{93EA92E5-423E-4026-A29C-DC3240D7B59D}" dt="2025-11-19T22:53:21.051" v="137" actId="2696"/>
-        <pc:sldMkLst>
-          <pc:docMk/>
-          <pc:sldMk cId="2461552133" sldId="734"/>
-        </pc:sldMkLst>
-      </pc:sldChg>
       <pc:sldChg chg="add">
         <pc:chgData name="Beckerle, Mike" userId="41155a9a-513c-4288-9ceb-5c90f574ab21" providerId="ADAL" clId="{93EA92E5-423E-4026-A29C-DC3240D7B59D}" dt="2025-11-19T22:35:05.456" v="0"/>
         <pc:sldMkLst>
@@ -1654,62 +989,6 @@
             <ac:spMk id="6" creationId="{F286EE7C-9F76-FEFC-CCD7-AF94CE710188}"/>
           </ac:spMkLst>
         </pc:spChg>
-      </pc:sldChg>
-      <pc:sldChg chg="del">
-        <pc:chgData name="Beckerle, Mike" userId="41155a9a-513c-4288-9ceb-5c90f574ab21" providerId="ADAL" clId="{93EA92E5-423E-4026-A29C-DC3240D7B59D}" dt="2025-11-19T22:35:19.103" v="75" actId="47"/>
-        <pc:sldMkLst>
-          <pc:docMk/>
-          <pc:sldMk cId="3745996886" sldId="828"/>
-        </pc:sldMkLst>
-      </pc:sldChg>
-      <pc:sldChg chg="del">
-        <pc:chgData name="Beckerle, Mike" userId="41155a9a-513c-4288-9ceb-5c90f574ab21" providerId="ADAL" clId="{93EA92E5-423E-4026-A29C-DC3240D7B59D}" dt="2025-11-19T22:35:19.103" v="75" actId="47"/>
-        <pc:sldMkLst>
-          <pc:docMk/>
-          <pc:sldMk cId="1947122302" sldId="829"/>
-        </pc:sldMkLst>
-      </pc:sldChg>
-      <pc:sldChg chg="del">
-        <pc:chgData name="Beckerle, Mike" userId="41155a9a-513c-4288-9ceb-5c90f574ab21" providerId="ADAL" clId="{93EA92E5-423E-4026-A29C-DC3240D7B59D}" dt="2025-11-19T22:35:19.103" v="75" actId="47"/>
-        <pc:sldMkLst>
-          <pc:docMk/>
-          <pc:sldMk cId="3562185190" sldId="830"/>
-        </pc:sldMkLst>
-      </pc:sldChg>
-      <pc:sldChg chg="del">
-        <pc:chgData name="Beckerle, Mike" userId="41155a9a-513c-4288-9ceb-5c90f574ab21" providerId="ADAL" clId="{93EA92E5-423E-4026-A29C-DC3240D7B59D}" dt="2025-11-19T22:35:19.103" v="75" actId="47"/>
-        <pc:sldMkLst>
-          <pc:docMk/>
-          <pc:sldMk cId="21496007" sldId="831"/>
-        </pc:sldMkLst>
-      </pc:sldChg>
-      <pc:sldChg chg="del">
-        <pc:chgData name="Beckerle, Mike" userId="41155a9a-513c-4288-9ceb-5c90f574ab21" providerId="ADAL" clId="{93EA92E5-423E-4026-A29C-DC3240D7B59D}" dt="2025-11-19T22:35:19.103" v="75" actId="47"/>
-        <pc:sldMkLst>
-          <pc:docMk/>
-          <pc:sldMk cId="3192896313" sldId="832"/>
-        </pc:sldMkLst>
-      </pc:sldChg>
-      <pc:sldChg chg="del">
-        <pc:chgData name="Beckerle, Mike" userId="41155a9a-513c-4288-9ceb-5c90f574ab21" providerId="ADAL" clId="{93EA92E5-423E-4026-A29C-DC3240D7B59D}" dt="2025-11-19T22:35:19.103" v="75" actId="47"/>
-        <pc:sldMkLst>
-          <pc:docMk/>
-          <pc:sldMk cId="1623818136" sldId="833"/>
-        </pc:sldMkLst>
-      </pc:sldChg>
-      <pc:sldChg chg="del">
-        <pc:chgData name="Beckerle, Mike" userId="41155a9a-513c-4288-9ceb-5c90f574ab21" providerId="ADAL" clId="{93EA92E5-423E-4026-A29C-DC3240D7B59D}" dt="2025-11-19T22:35:19.103" v="75" actId="47"/>
-        <pc:sldMkLst>
-          <pc:docMk/>
-          <pc:sldMk cId="1877614293" sldId="834"/>
-        </pc:sldMkLst>
-      </pc:sldChg>
-      <pc:sldChg chg="del">
-        <pc:chgData name="Beckerle, Mike" userId="41155a9a-513c-4288-9ceb-5c90f574ab21" providerId="ADAL" clId="{93EA92E5-423E-4026-A29C-DC3240D7B59D}" dt="2025-11-19T22:35:19.103" v="75" actId="47"/>
-        <pc:sldMkLst>
-          <pc:docMk/>
-          <pc:sldMk cId="1180673243" sldId="835"/>
-        </pc:sldMkLst>
       </pc:sldChg>
       <pc:sldMasterChg chg="delSldLayout">
         <pc:chgData name="Beckerle, Mike" userId="41155a9a-513c-4288-9ceb-5c90f574ab21" providerId="ADAL" clId="{93EA92E5-423E-4026-A29C-DC3240D7B59D}" dt="2025-11-19T22:35:19.103" v="75" actId="47"/>
@@ -1717,30 +996,6 @@
           <pc:docMk/>
           <pc:sldMasterMk cId="1196855914" sldId="2147483660"/>
         </pc:sldMasterMkLst>
-        <pc:sldLayoutChg chg="del">
-          <pc:chgData name="Beckerle, Mike" userId="41155a9a-513c-4288-9ceb-5c90f574ab21" providerId="ADAL" clId="{93EA92E5-423E-4026-A29C-DC3240D7B59D}" dt="2025-11-19T22:35:19.103" v="75" actId="47"/>
-          <pc:sldLayoutMkLst>
-            <pc:docMk/>
-            <pc:sldMasterMk cId="1196855914" sldId="2147483660"/>
-            <pc:sldLayoutMk cId="2499323582" sldId="2147483661"/>
-          </pc:sldLayoutMkLst>
-        </pc:sldLayoutChg>
-        <pc:sldLayoutChg chg="del">
-          <pc:chgData name="Beckerle, Mike" userId="41155a9a-513c-4288-9ceb-5c90f574ab21" providerId="ADAL" clId="{93EA92E5-423E-4026-A29C-DC3240D7B59D}" dt="2025-11-19T22:35:19.103" v="75" actId="47"/>
-          <pc:sldLayoutMkLst>
-            <pc:docMk/>
-            <pc:sldMasterMk cId="1196855914" sldId="2147483660"/>
-            <pc:sldLayoutMk cId="1362180090" sldId="2147483670"/>
-          </pc:sldLayoutMkLst>
-        </pc:sldLayoutChg>
-        <pc:sldLayoutChg chg="del">
-          <pc:chgData name="Beckerle, Mike" userId="41155a9a-513c-4288-9ceb-5c90f574ab21" providerId="ADAL" clId="{93EA92E5-423E-4026-A29C-DC3240D7B59D}" dt="2025-11-19T22:35:19.103" v="75" actId="47"/>
-          <pc:sldLayoutMkLst>
-            <pc:docMk/>
-            <pc:sldMasterMk cId="1196855914" sldId="2147483660"/>
-            <pc:sldLayoutMk cId="1665797064" sldId="2147483673"/>
-          </pc:sldLayoutMkLst>
-        </pc:sldLayoutChg>
       </pc:sldMasterChg>
     </pc:docChg>
   </pc:docChgLst>

</xml_diff>